<commit_message>
feat: save images for use in website
</commit_message>
<xml_diff>
--- a/slides/icons_for_slides.pptx
+++ b/slides/icons_for_slides.pptx
@@ -6,6 +6,7 @@
   </p:sldMasterIdLst>
   <p:sldIdLst>
     <p:sldId id="257" r:id="rId2"/>
+    <p:sldId id="258" r:id="rId3"/>
   </p:sldIdLst>
   <p:sldSz cx="12192000" cy="6858000"/>
   <p:notesSz cx="6858000" cy="9144000"/>
@@ -259,7 +260,7 @@
           <a:p>
             <a:fld id="{C08B18B5-B1C1-42FF-88E0-4384BC6CEBFD}" type="datetimeFigureOut">
               <a:rPr lang="en-US" smtClean="0"/>
-              <a:t>6/12/2024</a:t>
+              <a:t>6/14/2024</a:t>
             </a:fld>
             <a:endParaRPr lang="en-US"/>
           </a:p>
@@ -457,7 +458,7 @@
           <a:p>
             <a:fld id="{C08B18B5-B1C1-42FF-88E0-4384BC6CEBFD}" type="datetimeFigureOut">
               <a:rPr lang="en-US" smtClean="0"/>
-              <a:t>6/12/2024</a:t>
+              <a:t>6/14/2024</a:t>
             </a:fld>
             <a:endParaRPr lang="en-US"/>
           </a:p>
@@ -665,7 +666,7 @@
           <a:p>
             <a:fld id="{C08B18B5-B1C1-42FF-88E0-4384BC6CEBFD}" type="datetimeFigureOut">
               <a:rPr lang="en-US" smtClean="0"/>
-              <a:t>6/12/2024</a:t>
+              <a:t>6/14/2024</a:t>
             </a:fld>
             <a:endParaRPr lang="en-US"/>
           </a:p>
@@ -863,7 +864,7 @@
           <a:p>
             <a:fld id="{C08B18B5-B1C1-42FF-88E0-4384BC6CEBFD}" type="datetimeFigureOut">
               <a:rPr lang="en-US" smtClean="0"/>
-              <a:t>6/12/2024</a:t>
+              <a:t>6/14/2024</a:t>
             </a:fld>
             <a:endParaRPr lang="en-US"/>
           </a:p>
@@ -1138,7 +1139,7 @@
           <a:p>
             <a:fld id="{C08B18B5-B1C1-42FF-88E0-4384BC6CEBFD}" type="datetimeFigureOut">
               <a:rPr lang="en-US" smtClean="0"/>
-              <a:t>6/12/2024</a:t>
+              <a:t>6/14/2024</a:t>
             </a:fld>
             <a:endParaRPr lang="en-US"/>
           </a:p>
@@ -1403,7 +1404,7 @@
           <a:p>
             <a:fld id="{C08B18B5-B1C1-42FF-88E0-4384BC6CEBFD}" type="datetimeFigureOut">
               <a:rPr lang="en-US" smtClean="0"/>
-              <a:t>6/12/2024</a:t>
+              <a:t>6/14/2024</a:t>
             </a:fld>
             <a:endParaRPr lang="en-US"/>
           </a:p>
@@ -1815,7 +1816,7 @@
           <a:p>
             <a:fld id="{C08B18B5-B1C1-42FF-88E0-4384BC6CEBFD}" type="datetimeFigureOut">
               <a:rPr lang="en-US" smtClean="0"/>
-              <a:t>6/12/2024</a:t>
+              <a:t>6/14/2024</a:t>
             </a:fld>
             <a:endParaRPr lang="en-US"/>
           </a:p>
@@ -1956,7 +1957,7 @@
           <a:p>
             <a:fld id="{C08B18B5-B1C1-42FF-88E0-4384BC6CEBFD}" type="datetimeFigureOut">
               <a:rPr lang="en-US" smtClean="0"/>
-              <a:t>6/12/2024</a:t>
+              <a:t>6/14/2024</a:t>
             </a:fld>
             <a:endParaRPr lang="en-US"/>
           </a:p>
@@ -2069,7 +2070,7 @@
           <a:p>
             <a:fld id="{C08B18B5-B1C1-42FF-88E0-4384BC6CEBFD}" type="datetimeFigureOut">
               <a:rPr lang="en-US" smtClean="0"/>
-              <a:t>6/12/2024</a:t>
+              <a:t>6/14/2024</a:t>
             </a:fld>
             <a:endParaRPr lang="en-US"/>
           </a:p>
@@ -2380,7 +2381,7 @@
           <a:p>
             <a:fld id="{C08B18B5-B1C1-42FF-88E0-4384BC6CEBFD}" type="datetimeFigureOut">
               <a:rPr lang="en-US" smtClean="0"/>
-              <a:t>6/12/2024</a:t>
+              <a:t>6/14/2024</a:t>
             </a:fld>
             <a:endParaRPr lang="en-US"/>
           </a:p>
@@ -2668,7 +2669,7 @@
           <a:p>
             <a:fld id="{C08B18B5-B1C1-42FF-88E0-4384BC6CEBFD}" type="datetimeFigureOut">
               <a:rPr lang="en-US" smtClean="0"/>
-              <a:t>6/12/2024</a:t>
+              <a:t>6/14/2024</a:t>
             </a:fld>
             <a:endParaRPr lang="en-US"/>
           </a:p>
@@ -2909,7 +2910,7 @@
           <a:p>
             <a:fld id="{C08B18B5-B1C1-42FF-88E0-4384BC6CEBFD}" type="datetimeFigureOut">
               <a:rPr lang="en-US" smtClean="0"/>
-              <a:t>6/12/2024</a:t>
+              <a:t>6/14/2024</a:t>
             </a:fld>
             <a:endParaRPr lang="en-US"/>
           </a:p>
@@ -3649,6 +3650,1011 @@
 </p:sld>
 </file>
 
+<file path=ppt/slides/slide2.xml><?xml version="1.0" encoding="utf-8"?>
+<p:sld xmlns:a="http://schemas.openxmlformats.org/drawingml/2006/main" xmlns:r="http://schemas.openxmlformats.org/officeDocument/2006/relationships" xmlns:p="http://schemas.openxmlformats.org/presentationml/2006/main">
+  <p:cSld>
+    <p:spTree>
+      <p:nvGrpSpPr>
+        <p:cNvPr id="1" name=""/>
+        <p:cNvGrpSpPr/>
+        <p:nvPr/>
+      </p:nvGrpSpPr>
+      <p:grpSpPr>
+        <a:xfrm>
+          <a:off x="0" y="0"/>
+          <a:ext cx="0" cy="0"/>
+          <a:chOff x="0" y="0"/>
+          <a:chExt cx="0" cy="0"/>
+        </a:xfrm>
+      </p:grpSpPr>
+      <p:pic>
+        <p:nvPicPr>
+          <p:cNvPr id="3" name="Graphic 2" descr="Blog with solid fill">
+            <a:extLst>
+              <a:ext uri="{FF2B5EF4-FFF2-40B4-BE49-F238E27FC236}">
+                <a16:creationId xmlns:a16="http://schemas.microsoft.com/office/drawing/2014/main" id="{9E7840C4-585F-1211-A4F3-7BF95814D651}"/>
+              </a:ext>
+            </a:extLst>
+          </p:cNvPr>
+          <p:cNvPicPr>
+            <a:picLocks noChangeAspect="1"/>
+          </p:cNvPicPr>
+          <p:nvPr/>
+        </p:nvPicPr>
+        <p:blipFill>
+          <a:blip r:embed="rId2">
+            <a:extLst>
+              <a:ext uri="{28A0092B-C50C-407E-A947-70E740481C1C}">
+                <a14:useLocalDpi xmlns:a14="http://schemas.microsoft.com/office/drawing/2010/main" val="0"/>
+              </a:ext>
+              <a:ext uri="{96DAC541-7B7A-43D3-8B79-37D633B846F1}">
+                <asvg:svgBlip xmlns:asvg="http://schemas.microsoft.com/office/drawing/2016/SVG/main" r:embed="rId3"/>
+              </a:ext>
+            </a:extLst>
+          </a:blip>
+          <a:stretch>
+            <a:fillRect/>
+          </a:stretch>
+        </p:blipFill>
+        <p:spPr>
+          <a:xfrm>
+            <a:off x="2270377" y="193033"/>
+            <a:ext cx="1828800" cy="1828800"/>
+          </a:xfrm>
+          <a:prstGeom prst="rect">
+            <a:avLst/>
+          </a:prstGeom>
+        </p:spPr>
+      </p:pic>
+      <p:pic>
+        <p:nvPicPr>
+          <p:cNvPr id="5" name="Graphic 4" descr="Building with solid fill">
+            <a:extLst>
+              <a:ext uri="{FF2B5EF4-FFF2-40B4-BE49-F238E27FC236}">
+                <a16:creationId xmlns:a16="http://schemas.microsoft.com/office/drawing/2014/main" id="{22F82A6D-B182-3BC3-C981-B1ADF580F6FD}"/>
+              </a:ext>
+            </a:extLst>
+          </p:cNvPr>
+          <p:cNvPicPr>
+            <a:picLocks noChangeAspect="1"/>
+          </p:cNvPicPr>
+          <p:nvPr/>
+        </p:nvPicPr>
+        <p:blipFill>
+          <a:blip r:embed="rId4">
+            <a:extLst>
+              <a:ext uri="{28A0092B-C50C-407E-A947-70E740481C1C}">
+                <a14:useLocalDpi xmlns:a14="http://schemas.microsoft.com/office/drawing/2010/main" val="0"/>
+              </a:ext>
+              <a:ext uri="{96DAC541-7B7A-43D3-8B79-37D633B846F1}">
+                <asvg:svgBlip xmlns:asvg="http://schemas.microsoft.com/office/drawing/2016/SVG/main" r:embed="rId5"/>
+              </a:ext>
+            </a:extLst>
+          </a:blip>
+          <a:stretch>
+            <a:fillRect/>
+          </a:stretch>
+        </p:blipFill>
+        <p:spPr>
+          <a:xfrm>
+            <a:off x="3736904" y="1339746"/>
+            <a:ext cx="1828800" cy="1828800"/>
+          </a:xfrm>
+          <a:prstGeom prst="rect">
+            <a:avLst/>
+          </a:prstGeom>
+        </p:spPr>
+      </p:pic>
+      <p:pic>
+        <p:nvPicPr>
+          <p:cNvPr id="7" name="Graphic 6" descr="Building Brick Wall with solid fill">
+            <a:extLst>
+              <a:ext uri="{FF2B5EF4-FFF2-40B4-BE49-F238E27FC236}">
+                <a16:creationId xmlns:a16="http://schemas.microsoft.com/office/drawing/2014/main" id="{A497CF4A-5BCB-AF61-0F8D-A95371CE95D4}"/>
+              </a:ext>
+            </a:extLst>
+          </p:cNvPr>
+          <p:cNvPicPr>
+            <a:picLocks noChangeAspect="1"/>
+          </p:cNvPicPr>
+          <p:nvPr/>
+        </p:nvPicPr>
+        <p:blipFill>
+          <a:blip r:embed="rId6">
+            <a:extLst>
+              <a:ext uri="{28A0092B-C50C-407E-A947-70E740481C1C}">
+                <a14:useLocalDpi xmlns:a14="http://schemas.microsoft.com/office/drawing/2010/main" val="0"/>
+              </a:ext>
+              <a:ext uri="{96DAC541-7B7A-43D3-8B79-37D633B846F1}">
+                <asvg:svgBlip xmlns:asvg="http://schemas.microsoft.com/office/drawing/2016/SVG/main" r:embed="rId7"/>
+              </a:ext>
+            </a:extLst>
+          </a:blip>
+          <a:stretch>
+            <a:fillRect/>
+          </a:stretch>
+        </p:blipFill>
+        <p:spPr>
+          <a:xfrm>
+            <a:off x="5091995" y="1970113"/>
+            <a:ext cx="1828800" cy="1828800"/>
+          </a:xfrm>
+          <a:prstGeom prst="rect">
+            <a:avLst/>
+          </a:prstGeom>
+        </p:spPr>
+      </p:pic>
+      <p:pic>
+        <p:nvPicPr>
+          <p:cNvPr id="9" name="Graphic 8" descr="Check In with solid fill">
+            <a:extLst>
+              <a:ext uri="{FF2B5EF4-FFF2-40B4-BE49-F238E27FC236}">
+                <a16:creationId xmlns:a16="http://schemas.microsoft.com/office/drawing/2014/main" id="{940C8C0D-ADAB-7B20-1A8D-D0038C461995}"/>
+              </a:ext>
+            </a:extLst>
+          </p:cNvPr>
+          <p:cNvPicPr>
+            <a:picLocks noChangeAspect="1"/>
+          </p:cNvPicPr>
+          <p:nvPr/>
+        </p:nvPicPr>
+        <p:blipFill>
+          <a:blip r:embed="rId8">
+            <a:extLst>
+              <a:ext uri="{28A0092B-C50C-407E-A947-70E740481C1C}">
+                <a14:useLocalDpi xmlns:a14="http://schemas.microsoft.com/office/drawing/2010/main" val="0"/>
+              </a:ext>
+              <a:ext uri="{96DAC541-7B7A-43D3-8B79-37D633B846F1}">
+                <asvg:svgBlip xmlns:asvg="http://schemas.microsoft.com/office/drawing/2016/SVG/main" r:embed="rId9"/>
+              </a:ext>
+            </a:extLst>
+          </a:blip>
+          <a:stretch>
+            <a:fillRect/>
+          </a:stretch>
+        </p:blipFill>
+        <p:spPr>
+          <a:xfrm>
+            <a:off x="4037422" y="285738"/>
+            <a:ext cx="1828800" cy="1828800"/>
+          </a:xfrm>
+          <a:prstGeom prst="rect">
+            <a:avLst/>
+          </a:prstGeom>
+        </p:spPr>
+      </p:pic>
+      <p:pic>
+        <p:nvPicPr>
+          <p:cNvPr id="11" name="Graphic 10" descr="Clipboard with solid fill">
+            <a:extLst>
+              <a:ext uri="{FF2B5EF4-FFF2-40B4-BE49-F238E27FC236}">
+                <a16:creationId xmlns:a16="http://schemas.microsoft.com/office/drawing/2014/main" id="{977D92BB-4C58-9F2C-B590-49EA88B68854}"/>
+              </a:ext>
+            </a:extLst>
+          </p:cNvPr>
+          <p:cNvPicPr>
+            <a:picLocks noChangeAspect="1"/>
+          </p:cNvPicPr>
+          <p:nvPr/>
+        </p:nvPicPr>
+        <p:blipFill>
+          <a:blip r:embed="rId10">
+            <a:extLst>
+              <a:ext uri="{28A0092B-C50C-407E-A947-70E740481C1C}">
+                <a14:useLocalDpi xmlns:a14="http://schemas.microsoft.com/office/drawing/2010/main" val="0"/>
+              </a:ext>
+              <a:ext uri="{96DAC541-7B7A-43D3-8B79-37D633B846F1}">
+                <asvg:svgBlip xmlns:asvg="http://schemas.microsoft.com/office/drawing/2016/SVG/main" r:embed="rId11"/>
+              </a:ext>
+            </a:extLst>
+          </a:blip>
+          <a:stretch>
+            <a:fillRect/>
+          </a:stretch>
+        </p:blipFill>
+        <p:spPr>
+          <a:xfrm>
+            <a:off x="2374799" y="2377436"/>
+            <a:ext cx="1828800" cy="1828800"/>
+          </a:xfrm>
+          <a:prstGeom prst="rect">
+            <a:avLst/>
+          </a:prstGeom>
+        </p:spPr>
+      </p:pic>
+      <p:pic>
+        <p:nvPicPr>
+          <p:cNvPr id="13" name="Graphic 12" descr="Closed book with solid fill">
+            <a:extLst>
+              <a:ext uri="{FF2B5EF4-FFF2-40B4-BE49-F238E27FC236}">
+                <a16:creationId xmlns:a16="http://schemas.microsoft.com/office/drawing/2014/main" id="{D0FE2374-234A-7829-4B99-016C39BDA272}"/>
+              </a:ext>
+            </a:extLst>
+          </p:cNvPr>
+          <p:cNvPicPr>
+            <a:picLocks noChangeAspect="1"/>
+          </p:cNvPicPr>
+          <p:nvPr/>
+        </p:nvPicPr>
+        <p:blipFill>
+          <a:blip r:embed="rId12">
+            <a:extLst>
+              <a:ext uri="{28A0092B-C50C-407E-A947-70E740481C1C}">
+                <a14:useLocalDpi xmlns:a14="http://schemas.microsoft.com/office/drawing/2010/main" val="0"/>
+              </a:ext>
+              <a:ext uri="{96DAC541-7B7A-43D3-8B79-37D633B846F1}">
+                <asvg:svgBlip xmlns:asvg="http://schemas.microsoft.com/office/drawing/2016/SVG/main" r:embed="rId13"/>
+              </a:ext>
+            </a:extLst>
+          </a:blip>
+          <a:stretch>
+            <a:fillRect/>
+          </a:stretch>
+        </p:blipFill>
+        <p:spPr>
+          <a:xfrm>
+            <a:off x="5074025" y="227838"/>
+            <a:ext cx="1828800" cy="1828800"/>
+          </a:xfrm>
+          <a:prstGeom prst="rect">
+            <a:avLst/>
+          </a:prstGeom>
+        </p:spPr>
+      </p:pic>
+      <p:pic>
+        <p:nvPicPr>
+          <p:cNvPr id="15" name="Graphic 14" descr="Cmd Terminal with solid fill">
+            <a:extLst>
+              <a:ext uri="{FF2B5EF4-FFF2-40B4-BE49-F238E27FC236}">
+                <a16:creationId xmlns:a16="http://schemas.microsoft.com/office/drawing/2014/main" id="{42B36E56-30C4-CA78-D82E-3B25398CC6D7}"/>
+              </a:ext>
+            </a:extLst>
+          </p:cNvPr>
+          <p:cNvPicPr>
+            <a:picLocks noChangeAspect="1"/>
+          </p:cNvPicPr>
+          <p:nvPr/>
+        </p:nvPicPr>
+        <p:blipFill>
+          <a:blip r:embed="rId14">
+            <a:extLst>
+              <a:ext uri="{28A0092B-C50C-407E-A947-70E740481C1C}">
+                <a14:useLocalDpi xmlns:a14="http://schemas.microsoft.com/office/drawing/2010/main" val="0"/>
+              </a:ext>
+              <a:ext uri="{96DAC541-7B7A-43D3-8B79-37D633B846F1}">
+                <asvg:svgBlip xmlns:asvg="http://schemas.microsoft.com/office/drawing/2016/SVG/main" r:embed="rId15"/>
+              </a:ext>
+            </a:extLst>
+          </a:blip>
+          <a:stretch>
+            <a:fillRect/>
+          </a:stretch>
+        </p:blipFill>
+        <p:spPr>
+          <a:xfrm>
+            <a:off x="381130" y="-29468"/>
+            <a:ext cx="1828800" cy="1828800"/>
+          </a:xfrm>
+          <a:prstGeom prst="rect">
+            <a:avLst/>
+          </a:prstGeom>
+        </p:spPr>
+      </p:pic>
+      <p:pic>
+        <p:nvPicPr>
+          <p:cNvPr id="17" name="Graphic 16" descr="Computer with solid fill">
+            <a:extLst>
+              <a:ext uri="{FF2B5EF4-FFF2-40B4-BE49-F238E27FC236}">
+                <a16:creationId xmlns:a16="http://schemas.microsoft.com/office/drawing/2014/main" id="{20ED898D-629F-0311-BCEF-CA219BCACD0E}"/>
+              </a:ext>
+            </a:extLst>
+          </p:cNvPr>
+          <p:cNvPicPr>
+            <a:picLocks noChangeAspect="1"/>
+          </p:cNvPicPr>
+          <p:nvPr/>
+        </p:nvPicPr>
+        <p:blipFill>
+          <a:blip r:embed="rId16">
+            <a:extLst>
+              <a:ext uri="{28A0092B-C50C-407E-A947-70E740481C1C}">
+                <a14:useLocalDpi xmlns:a14="http://schemas.microsoft.com/office/drawing/2010/main" val="0"/>
+              </a:ext>
+              <a:ext uri="{96DAC541-7B7A-43D3-8B79-37D633B846F1}">
+                <asvg:svgBlip xmlns:asvg="http://schemas.microsoft.com/office/drawing/2016/SVG/main" r:embed="rId17"/>
+              </a:ext>
+            </a:extLst>
+          </a:blip>
+          <a:stretch>
+            <a:fillRect/>
+          </a:stretch>
+        </p:blipFill>
+        <p:spPr>
+          <a:xfrm>
+            <a:off x="589973" y="1055713"/>
+            <a:ext cx="1828800" cy="1828800"/>
+          </a:xfrm>
+          <a:prstGeom prst="rect">
+            <a:avLst/>
+          </a:prstGeom>
+        </p:spPr>
+      </p:pic>
+      <p:pic>
+        <p:nvPicPr>
+          <p:cNvPr id="19" name="Graphic 18" descr="Court with solid fill">
+            <a:extLst>
+              <a:ext uri="{FF2B5EF4-FFF2-40B4-BE49-F238E27FC236}">
+                <a16:creationId xmlns:a16="http://schemas.microsoft.com/office/drawing/2014/main" id="{EF42F016-B88D-5FEA-DA4B-2C3CAAAAF337}"/>
+              </a:ext>
+            </a:extLst>
+          </p:cNvPr>
+          <p:cNvPicPr>
+            <a:picLocks noChangeAspect="1"/>
+          </p:cNvPicPr>
+          <p:nvPr/>
+        </p:nvPicPr>
+        <p:blipFill>
+          <a:blip r:embed="rId18">
+            <a:extLst>
+              <a:ext uri="{28A0092B-C50C-407E-A947-70E740481C1C}">
+                <a14:useLocalDpi xmlns:a14="http://schemas.microsoft.com/office/drawing/2010/main" val="0"/>
+              </a:ext>
+              <a:ext uri="{96DAC541-7B7A-43D3-8B79-37D633B846F1}">
+                <asvg:svgBlip xmlns:asvg="http://schemas.microsoft.com/office/drawing/2016/SVG/main" r:embed="rId19"/>
+              </a:ext>
+            </a:extLst>
+          </a:blip>
+          <a:stretch>
+            <a:fillRect/>
+          </a:stretch>
+        </p:blipFill>
+        <p:spPr>
+          <a:xfrm>
+            <a:off x="381130" y="2297133"/>
+            <a:ext cx="1828800" cy="1828800"/>
+          </a:xfrm>
+          <a:prstGeom prst="rect">
+            <a:avLst/>
+          </a:prstGeom>
+        </p:spPr>
+      </p:pic>
+      <p:pic>
+        <p:nvPicPr>
+          <p:cNvPr id="21" name="Graphic 20" descr="Document with solid fill">
+            <a:extLst>
+              <a:ext uri="{FF2B5EF4-FFF2-40B4-BE49-F238E27FC236}">
+                <a16:creationId xmlns:a16="http://schemas.microsoft.com/office/drawing/2014/main" id="{36F33CC6-51E1-14E8-9247-E42FA17CAA7D}"/>
+              </a:ext>
+            </a:extLst>
+          </p:cNvPr>
+          <p:cNvPicPr>
+            <a:picLocks noChangeAspect="1"/>
+          </p:cNvPicPr>
+          <p:nvPr/>
+        </p:nvPicPr>
+        <p:blipFill>
+          <a:blip r:embed="rId20">
+            <a:extLst>
+              <a:ext uri="{28A0092B-C50C-407E-A947-70E740481C1C}">
+                <a14:useLocalDpi xmlns:a14="http://schemas.microsoft.com/office/drawing/2010/main" val="0"/>
+              </a:ext>
+              <a:ext uri="{96DAC541-7B7A-43D3-8B79-37D633B846F1}">
+                <asvg:svgBlip xmlns:asvg="http://schemas.microsoft.com/office/drawing/2016/SVG/main" r:embed="rId21"/>
+              </a:ext>
+            </a:extLst>
+          </a:blip>
+          <a:stretch>
+            <a:fillRect/>
+          </a:stretch>
+        </p:blipFill>
+        <p:spPr>
+          <a:xfrm>
+            <a:off x="2586000" y="3684760"/>
+            <a:ext cx="1828800" cy="1828800"/>
+          </a:xfrm>
+          <a:prstGeom prst="rect">
+            <a:avLst/>
+          </a:prstGeom>
+        </p:spPr>
+      </p:pic>
+      <p:pic>
+        <p:nvPicPr>
+          <p:cNvPr id="23" name="Graphic 22" descr="Email with solid fill">
+            <a:extLst>
+              <a:ext uri="{FF2B5EF4-FFF2-40B4-BE49-F238E27FC236}">
+                <a16:creationId xmlns:a16="http://schemas.microsoft.com/office/drawing/2014/main" id="{6122F337-12B9-7676-AD57-B92AA95B3C74}"/>
+              </a:ext>
+            </a:extLst>
+          </p:cNvPr>
+          <p:cNvPicPr>
+            <a:picLocks noChangeAspect="1"/>
+          </p:cNvPicPr>
+          <p:nvPr/>
+        </p:nvPicPr>
+        <p:blipFill>
+          <a:blip r:embed="rId22">
+            <a:extLst>
+              <a:ext uri="{28A0092B-C50C-407E-A947-70E740481C1C}">
+                <a14:useLocalDpi xmlns:a14="http://schemas.microsoft.com/office/drawing/2010/main" val="0"/>
+              </a:ext>
+              <a:ext uri="{96DAC541-7B7A-43D3-8B79-37D633B846F1}">
+                <asvg:svgBlip xmlns:asvg="http://schemas.microsoft.com/office/drawing/2016/SVG/main" r:embed="rId23"/>
+              </a:ext>
+            </a:extLst>
+          </a:blip>
+          <a:stretch>
+            <a:fillRect/>
+          </a:stretch>
+        </p:blipFill>
+        <p:spPr>
+          <a:xfrm>
+            <a:off x="4550400" y="3504833"/>
+            <a:ext cx="1828800" cy="1828800"/>
+          </a:xfrm>
+          <a:prstGeom prst="rect">
+            <a:avLst/>
+          </a:prstGeom>
+        </p:spPr>
+      </p:pic>
+      <p:pic>
+        <p:nvPicPr>
+          <p:cNvPr id="25" name="Graphic 24" descr="Employee badge with solid fill">
+            <a:extLst>
+              <a:ext uri="{FF2B5EF4-FFF2-40B4-BE49-F238E27FC236}">
+                <a16:creationId xmlns:a16="http://schemas.microsoft.com/office/drawing/2014/main" id="{0A646FE7-E1D7-12D9-441F-DF22DCCA5F62}"/>
+              </a:ext>
+            </a:extLst>
+          </p:cNvPr>
+          <p:cNvPicPr>
+            <a:picLocks noChangeAspect="1"/>
+          </p:cNvPicPr>
+          <p:nvPr/>
+        </p:nvPicPr>
+        <p:blipFill>
+          <a:blip r:embed="rId24">
+            <a:extLst>
+              <a:ext uri="{28A0092B-C50C-407E-A947-70E740481C1C}">
+                <a14:useLocalDpi xmlns:a14="http://schemas.microsoft.com/office/drawing/2010/main" val="0"/>
+              </a:ext>
+              <a:ext uri="{96DAC541-7B7A-43D3-8B79-37D633B846F1}">
+                <asvg:svgBlip xmlns:asvg="http://schemas.microsoft.com/office/drawing/2016/SVG/main" r:embed="rId25"/>
+              </a:ext>
+            </a:extLst>
+          </a:blip>
+          <a:stretch>
+            <a:fillRect/>
+          </a:stretch>
+        </p:blipFill>
+        <p:spPr>
+          <a:xfrm>
+            <a:off x="589973" y="3695473"/>
+            <a:ext cx="1828800" cy="1828800"/>
+          </a:xfrm>
+          <a:prstGeom prst="rect">
+            <a:avLst/>
+          </a:prstGeom>
+        </p:spPr>
+      </p:pic>
+      <p:pic>
+        <p:nvPicPr>
+          <p:cNvPr id="27" name="Graphic 26" descr="Envelope with solid fill">
+            <a:extLst>
+              <a:ext uri="{FF2B5EF4-FFF2-40B4-BE49-F238E27FC236}">
+                <a16:creationId xmlns:a16="http://schemas.microsoft.com/office/drawing/2014/main" id="{7DA6C27B-BF86-5CEB-1DC5-FCE05F5EB9F5}"/>
+              </a:ext>
+            </a:extLst>
+          </p:cNvPr>
+          <p:cNvPicPr>
+            <a:picLocks noChangeAspect="1"/>
+          </p:cNvPicPr>
+          <p:nvPr/>
+        </p:nvPicPr>
+        <p:blipFill>
+          <a:blip r:embed="rId26">
+            <a:extLst>
+              <a:ext uri="{28A0092B-C50C-407E-A947-70E740481C1C}">
+                <a14:useLocalDpi xmlns:a14="http://schemas.microsoft.com/office/drawing/2010/main" val="0"/>
+              </a:ext>
+              <a:ext uri="{96DAC541-7B7A-43D3-8B79-37D633B846F1}">
+                <asvg:svgBlip xmlns:asvg="http://schemas.microsoft.com/office/drawing/2016/SVG/main" r:embed="rId27"/>
+              </a:ext>
+            </a:extLst>
+          </a:blip>
+          <a:stretch>
+            <a:fillRect/>
+          </a:stretch>
+        </p:blipFill>
+        <p:spPr>
+          <a:xfrm>
+            <a:off x="476310" y="5148913"/>
+            <a:ext cx="1828800" cy="1828800"/>
+          </a:xfrm>
+          <a:prstGeom prst="rect">
+            <a:avLst/>
+          </a:prstGeom>
+        </p:spPr>
+      </p:pic>
+      <p:pic>
+        <p:nvPicPr>
+          <p:cNvPr id="29" name="Graphic 28" descr="Filing Box Archive with solid fill">
+            <a:extLst>
+              <a:ext uri="{FF2B5EF4-FFF2-40B4-BE49-F238E27FC236}">
+                <a16:creationId xmlns:a16="http://schemas.microsoft.com/office/drawing/2014/main" id="{8E52FF61-3F57-D1B4-F086-2853E8C60677}"/>
+              </a:ext>
+            </a:extLst>
+          </p:cNvPr>
+          <p:cNvPicPr>
+            <a:picLocks noChangeAspect="1"/>
+          </p:cNvPicPr>
+          <p:nvPr/>
+        </p:nvPicPr>
+        <p:blipFill>
+          <a:blip r:embed="rId28">
+            <a:extLst>
+              <a:ext uri="{28A0092B-C50C-407E-A947-70E740481C1C}">
+                <a14:useLocalDpi xmlns:a14="http://schemas.microsoft.com/office/drawing/2010/main" val="0"/>
+              </a:ext>
+              <a:ext uri="{96DAC541-7B7A-43D3-8B79-37D633B846F1}">
+                <asvg:svgBlip xmlns:asvg="http://schemas.microsoft.com/office/drawing/2016/SVG/main" r:embed="rId29"/>
+              </a:ext>
+            </a:extLst>
+          </a:blip>
+          <a:stretch>
+            <a:fillRect/>
+          </a:stretch>
+        </p:blipFill>
+        <p:spPr>
+          <a:xfrm>
+            <a:off x="2520017" y="5180687"/>
+            <a:ext cx="1828800" cy="1828800"/>
+          </a:xfrm>
+          <a:prstGeom prst="rect">
+            <a:avLst/>
+          </a:prstGeom>
+        </p:spPr>
+      </p:pic>
+      <p:pic>
+        <p:nvPicPr>
+          <p:cNvPr id="31" name="Graphic 30" descr="Flowchart with solid fill">
+            <a:extLst>
+              <a:ext uri="{FF2B5EF4-FFF2-40B4-BE49-F238E27FC236}">
+                <a16:creationId xmlns:a16="http://schemas.microsoft.com/office/drawing/2014/main" id="{0DDB8D54-C86C-AA24-01A1-A32F1F3EF1F8}"/>
+              </a:ext>
+            </a:extLst>
+          </p:cNvPr>
+          <p:cNvPicPr>
+            <a:picLocks noChangeAspect="1"/>
+          </p:cNvPicPr>
+          <p:nvPr/>
+        </p:nvPicPr>
+        <p:blipFill>
+          <a:blip r:embed="rId30">
+            <a:extLst>
+              <a:ext uri="{28A0092B-C50C-407E-A947-70E740481C1C}">
+                <a14:useLocalDpi xmlns:a14="http://schemas.microsoft.com/office/drawing/2010/main" val="0"/>
+              </a:ext>
+              <a:ext uri="{96DAC541-7B7A-43D3-8B79-37D633B846F1}">
+                <asvg:svgBlip xmlns:asvg="http://schemas.microsoft.com/office/drawing/2016/SVG/main" r:embed="rId31"/>
+              </a:ext>
+            </a:extLst>
+          </a:blip>
+          <a:stretch>
+            <a:fillRect/>
+          </a:stretch>
+        </p:blipFill>
+        <p:spPr>
+          <a:xfrm>
+            <a:off x="4331813" y="5019233"/>
+            <a:ext cx="1828800" cy="1828800"/>
+          </a:xfrm>
+          <a:prstGeom prst="rect">
+            <a:avLst/>
+          </a:prstGeom>
+        </p:spPr>
+      </p:pic>
+      <p:pic>
+        <p:nvPicPr>
+          <p:cNvPr id="33" name="Graphic 32" descr="Folder with solid fill">
+            <a:extLst>
+              <a:ext uri="{FF2B5EF4-FFF2-40B4-BE49-F238E27FC236}">
+                <a16:creationId xmlns:a16="http://schemas.microsoft.com/office/drawing/2014/main" id="{24C16E26-75F8-4541-2DE9-77E8D025586D}"/>
+              </a:ext>
+            </a:extLst>
+          </p:cNvPr>
+          <p:cNvPicPr>
+            <a:picLocks noChangeAspect="1"/>
+          </p:cNvPicPr>
+          <p:nvPr/>
+        </p:nvPicPr>
+        <p:blipFill>
+          <a:blip r:embed="rId32">
+            <a:extLst>
+              <a:ext uri="{28A0092B-C50C-407E-A947-70E740481C1C}">
+                <a14:useLocalDpi xmlns:a14="http://schemas.microsoft.com/office/drawing/2010/main" val="0"/>
+              </a:ext>
+              <a:ext uri="{96DAC541-7B7A-43D3-8B79-37D633B846F1}">
+                <asvg:svgBlip xmlns:asvg="http://schemas.microsoft.com/office/drawing/2016/SVG/main" r:embed="rId33"/>
+              </a:ext>
+            </a:extLst>
+          </a:blip>
+          <a:stretch>
+            <a:fillRect/>
+          </a:stretch>
+        </p:blipFill>
+        <p:spPr>
+          <a:xfrm>
+            <a:off x="6581008" y="2727313"/>
+            <a:ext cx="1828800" cy="1828800"/>
+          </a:xfrm>
+          <a:prstGeom prst="rect">
+            <a:avLst/>
+          </a:prstGeom>
+        </p:spPr>
+      </p:pic>
+      <p:pic>
+        <p:nvPicPr>
+          <p:cNvPr id="35" name="Graphic 34" descr="Folder Search with solid fill">
+            <a:extLst>
+              <a:ext uri="{FF2B5EF4-FFF2-40B4-BE49-F238E27FC236}">
+                <a16:creationId xmlns:a16="http://schemas.microsoft.com/office/drawing/2014/main" id="{E2C2008D-2C06-5976-29FD-D429F9150ABC}"/>
+              </a:ext>
+            </a:extLst>
+          </p:cNvPr>
+          <p:cNvPicPr>
+            <a:picLocks noChangeAspect="1"/>
+          </p:cNvPicPr>
+          <p:nvPr/>
+        </p:nvPicPr>
+        <p:blipFill>
+          <a:blip r:embed="rId34">
+            <a:extLst>
+              <a:ext uri="{28A0092B-C50C-407E-A947-70E740481C1C}">
+                <a14:useLocalDpi xmlns:a14="http://schemas.microsoft.com/office/drawing/2010/main" val="0"/>
+              </a:ext>
+              <a:ext uri="{96DAC541-7B7A-43D3-8B79-37D633B846F1}">
+                <asvg:svgBlip xmlns:asvg="http://schemas.microsoft.com/office/drawing/2016/SVG/main" r:embed="rId35"/>
+              </a:ext>
+            </a:extLst>
+          </a:blip>
+          <a:stretch>
+            <a:fillRect/>
+          </a:stretch>
+        </p:blipFill>
+        <p:spPr>
+          <a:xfrm>
+            <a:off x="6515620" y="762913"/>
+            <a:ext cx="1828800" cy="1828800"/>
+          </a:xfrm>
+          <a:prstGeom prst="rect">
+            <a:avLst/>
+          </a:prstGeom>
+        </p:spPr>
+      </p:pic>
+      <p:pic>
+        <p:nvPicPr>
+          <p:cNvPr id="37" name="Graphic 36" descr="Images with solid fill">
+            <a:extLst>
+              <a:ext uri="{FF2B5EF4-FFF2-40B4-BE49-F238E27FC236}">
+                <a16:creationId xmlns:a16="http://schemas.microsoft.com/office/drawing/2014/main" id="{62F38099-F070-3ADF-9328-9C469D56F897}"/>
+              </a:ext>
+            </a:extLst>
+          </p:cNvPr>
+          <p:cNvPicPr>
+            <a:picLocks noChangeAspect="1"/>
+          </p:cNvPicPr>
+          <p:nvPr/>
+        </p:nvPicPr>
+        <p:blipFill>
+          <a:blip r:embed="rId36">
+            <a:extLst>
+              <a:ext uri="{28A0092B-C50C-407E-A947-70E740481C1C}">
+                <a14:useLocalDpi xmlns:a14="http://schemas.microsoft.com/office/drawing/2010/main" val="0"/>
+              </a:ext>
+              <a:ext uri="{96DAC541-7B7A-43D3-8B79-37D633B846F1}">
+                <asvg:svgBlip xmlns:asvg="http://schemas.microsoft.com/office/drawing/2016/SVG/main" r:embed="rId37"/>
+              </a:ext>
+            </a:extLst>
+          </a:blip>
+          <a:stretch>
+            <a:fillRect/>
+          </a:stretch>
+        </p:blipFill>
+        <p:spPr>
+          <a:xfrm>
+            <a:off x="6319936" y="4953028"/>
+            <a:ext cx="1828800" cy="1828800"/>
+          </a:xfrm>
+          <a:prstGeom prst="rect">
+            <a:avLst/>
+          </a:prstGeom>
+        </p:spPr>
+      </p:pic>
+      <p:pic>
+        <p:nvPicPr>
+          <p:cNvPr id="39" name="Graphic 38" descr="Internet with solid fill">
+            <a:extLst>
+              <a:ext uri="{FF2B5EF4-FFF2-40B4-BE49-F238E27FC236}">
+                <a16:creationId xmlns:a16="http://schemas.microsoft.com/office/drawing/2014/main" id="{2C420E0C-969E-D5D5-9729-4372260D6B58}"/>
+              </a:ext>
+            </a:extLst>
+          </p:cNvPr>
+          <p:cNvPicPr>
+            <a:picLocks noChangeAspect="1"/>
+          </p:cNvPicPr>
+          <p:nvPr/>
+        </p:nvPicPr>
+        <p:blipFill>
+          <a:blip r:embed="rId38">
+            <a:extLst>
+              <a:ext uri="{28A0092B-C50C-407E-A947-70E740481C1C}">
+                <a14:useLocalDpi xmlns:a14="http://schemas.microsoft.com/office/drawing/2010/main" val="0"/>
+              </a:ext>
+              <a:ext uri="{96DAC541-7B7A-43D3-8B79-37D633B846F1}">
+                <asvg:svgBlip xmlns:asvg="http://schemas.microsoft.com/office/drawing/2016/SVG/main" r:embed="rId39"/>
+              </a:ext>
+            </a:extLst>
+          </a:blip>
+          <a:stretch>
+            <a:fillRect/>
+          </a:stretch>
+        </p:blipFill>
+        <p:spPr>
+          <a:xfrm>
+            <a:off x="8466825" y="3777313"/>
+            <a:ext cx="1828800" cy="1828800"/>
+          </a:xfrm>
+          <a:prstGeom prst="rect">
+            <a:avLst/>
+          </a:prstGeom>
+        </p:spPr>
+      </p:pic>
+      <p:pic>
+        <p:nvPicPr>
+          <p:cNvPr id="41" name="Graphic 40" descr="Newspaper with solid fill">
+            <a:extLst>
+              <a:ext uri="{FF2B5EF4-FFF2-40B4-BE49-F238E27FC236}">
+                <a16:creationId xmlns:a16="http://schemas.microsoft.com/office/drawing/2014/main" id="{2ECC3F66-694A-20DC-8BA2-FE2602DC5CB7}"/>
+              </a:ext>
+            </a:extLst>
+          </p:cNvPr>
+          <p:cNvPicPr>
+            <a:picLocks noChangeAspect="1"/>
+          </p:cNvPicPr>
+          <p:nvPr/>
+        </p:nvPicPr>
+        <p:blipFill>
+          <a:blip r:embed="rId40">
+            <a:extLst>
+              <a:ext uri="{28A0092B-C50C-407E-A947-70E740481C1C}">
+                <a14:useLocalDpi xmlns:a14="http://schemas.microsoft.com/office/drawing/2010/main" val="0"/>
+              </a:ext>
+              <a:ext uri="{96DAC541-7B7A-43D3-8B79-37D633B846F1}">
+                <asvg:svgBlip xmlns:asvg="http://schemas.microsoft.com/office/drawing/2016/SVG/main" r:embed="rId41"/>
+              </a:ext>
+            </a:extLst>
+          </a:blip>
+          <a:stretch>
+            <a:fillRect/>
+          </a:stretch>
+        </p:blipFill>
+        <p:spPr>
+          <a:xfrm>
+            <a:off x="8204320" y="5356060"/>
+            <a:ext cx="1828800" cy="1828800"/>
+          </a:xfrm>
+          <a:prstGeom prst="rect">
+            <a:avLst/>
+          </a:prstGeom>
+        </p:spPr>
+      </p:pic>
+      <p:pic>
+        <p:nvPicPr>
+          <p:cNvPr id="43" name="Graphic 42" descr="Statistics with solid fill">
+            <a:extLst>
+              <a:ext uri="{FF2B5EF4-FFF2-40B4-BE49-F238E27FC236}">
+                <a16:creationId xmlns:a16="http://schemas.microsoft.com/office/drawing/2014/main" id="{2D8C0F43-BD07-3137-5E75-ECEEB28B0AFC}"/>
+              </a:ext>
+            </a:extLst>
+          </p:cNvPr>
+          <p:cNvPicPr>
+            <a:picLocks noChangeAspect="1"/>
+          </p:cNvPicPr>
+          <p:nvPr/>
+        </p:nvPicPr>
+        <p:blipFill>
+          <a:blip r:embed="rId42">
+            <a:extLst>
+              <a:ext uri="{28A0092B-C50C-407E-A947-70E740481C1C}">
+                <a14:useLocalDpi xmlns:a14="http://schemas.microsoft.com/office/drawing/2010/main" val="0"/>
+              </a:ext>
+              <a:ext uri="{96DAC541-7B7A-43D3-8B79-37D633B846F1}">
+                <asvg:svgBlip xmlns:asvg="http://schemas.microsoft.com/office/drawing/2016/SVG/main" r:embed="rId43"/>
+              </a:ext>
+            </a:extLst>
+          </a:blip>
+          <a:stretch>
+            <a:fillRect/>
+          </a:stretch>
+        </p:blipFill>
+        <p:spPr>
+          <a:xfrm>
+            <a:off x="8276870" y="1670113"/>
+            <a:ext cx="1828800" cy="1828800"/>
+          </a:xfrm>
+          <a:prstGeom prst="rect">
+            <a:avLst/>
+          </a:prstGeom>
+        </p:spPr>
+      </p:pic>
+      <p:pic>
+        <p:nvPicPr>
+          <p:cNvPr id="45" name="Graphic 44" descr="Subtitles with solid fill">
+            <a:extLst>
+              <a:ext uri="{FF2B5EF4-FFF2-40B4-BE49-F238E27FC236}">
+                <a16:creationId xmlns:a16="http://schemas.microsoft.com/office/drawing/2014/main" id="{A810E46A-CD5A-570F-0C8A-599C4B1FCEF7}"/>
+              </a:ext>
+            </a:extLst>
+          </p:cNvPr>
+          <p:cNvPicPr>
+            <a:picLocks noChangeAspect="1"/>
+          </p:cNvPicPr>
+          <p:nvPr/>
+        </p:nvPicPr>
+        <p:blipFill>
+          <a:blip r:embed="rId44">
+            <a:extLst>
+              <a:ext uri="{28A0092B-C50C-407E-A947-70E740481C1C}">
+                <a14:useLocalDpi xmlns:a14="http://schemas.microsoft.com/office/drawing/2010/main" val="0"/>
+              </a:ext>
+              <a:ext uri="{96DAC541-7B7A-43D3-8B79-37D633B846F1}">
+                <asvg:svgBlip xmlns:asvg="http://schemas.microsoft.com/office/drawing/2016/SVG/main" r:embed="rId45"/>
+              </a:ext>
+            </a:extLst>
+          </a:blip>
+          <a:stretch>
+            <a:fillRect/>
+          </a:stretch>
+        </p:blipFill>
+        <p:spPr>
+          <a:xfrm>
+            <a:off x="8141270" y="76173"/>
+            <a:ext cx="1828800" cy="1828800"/>
+          </a:xfrm>
+          <a:prstGeom prst="rect">
+            <a:avLst/>
+          </a:prstGeom>
+        </p:spPr>
+      </p:pic>
+      <p:pic>
+        <p:nvPicPr>
+          <p:cNvPr id="47" name="Graphic 46" descr="Upward trend with solid fill">
+            <a:extLst>
+              <a:ext uri="{FF2B5EF4-FFF2-40B4-BE49-F238E27FC236}">
+                <a16:creationId xmlns:a16="http://schemas.microsoft.com/office/drawing/2014/main" id="{8A6191AA-E866-A409-19D7-F923F433B97D}"/>
+              </a:ext>
+            </a:extLst>
+          </p:cNvPr>
+          <p:cNvPicPr>
+            <a:picLocks noChangeAspect="1"/>
+          </p:cNvPicPr>
+          <p:nvPr/>
+        </p:nvPicPr>
+        <p:blipFill>
+          <a:blip r:embed="rId46">
+            <a:extLst>
+              <a:ext uri="{28A0092B-C50C-407E-A947-70E740481C1C}">
+                <a14:useLocalDpi xmlns:a14="http://schemas.microsoft.com/office/drawing/2010/main" val="0"/>
+              </a:ext>
+              <a:ext uri="{96DAC541-7B7A-43D3-8B79-37D633B846F1}">
+                <asvg:svgBlip xmlns:asvg="http://schemas.microsoft.com/office/drawing/2016/SVG/main" r:embed="rId47"/>
+              </a:ext>
+            </a:extLst>
+          </a:blip>
+          <a:stretch>
+            <a:fillRect/>
+          </a:stretch>
+        </p:blipFill>
+        <p:spPr>
+          <a:xfrm>
+            <a:off x="10261617" y="3934513"/>
+            <a:ext cx="1828800" cy="1828800"/>
+          </a:xfrm>
+          <a:prstGeom prst="rect">
+            <a:avLst/>
+          </a:prstGeom>
+        </p:spPr>
+      </p:pic>
+      <p:pic>
+        <p:nvPicPr>
+          <p:cNvPr id="49" name="Graphic 48" descr="Wireless with solid fill">
+            <a:extLst>
+              <a:ext uri="{FF2B5EF4-FFF2-40B4-BE49-F238E27FC236}">
+                <a16:creationId xmlns:a16="http://schemas.microsoft.com/office/drawing/2014/main" id="{4F299EC3-AB85-1619-1686-1B6873158B87}"/>
+              </a:ext>
+            </a:extLst>
+          </p:cNvPr>
+          <p:cNvPicPr>
+            <a:picLocks noChangeAspect="1"/>
+          </p:cNvPicPr>
+          <p:nvPr/>
+        </p:nvPicPr>
+        <p:blipFill>
+          <a:blip r:embed="rId48">
+            <a:extLst>
+              <a:ext uri="{28A0092B-C50C-407E-A947-70E740481C1C}">
+                <a14:useLocalDpi xmlns:a14="http://schemas.microsoft.com/office/drawing/2010/main" val="0"/>
+              </a:ext>
+              <a:ext uri="{96DAC541-7B7A-43D3-8B79-37D633B846F1}">
+                <asvg:svgBlip xmlns:asvg="http://schemas.microsoft.com/office/drawing/2016/SVG/main" r:embed="rId49"/>
+              </a:ext>
+            </a:extLst>
+          </a:blip>
+          <a:stretch>
+            <a:fillRect/>
+          </a:stretch>
+        </p:blipFill>
+        <p:spPr>
+          <a:xfrm>
+            <a:off x="10261617" y="2096348"/>
+            <a:ext cx="1828800" cy="1828800"/>
+          </a:xfrm>
+          <a:prstGeom prst="rect">
+            <a:avLst/>
+          </a:prstGeom>
+        </p:spPr>
+      </p:pic>
+      <p:pic>
+        <p:nvPicPr>
+          <p:cNvPr id="51" name="Graphic 50" descr="Wireless router with solid fill">
+            <a:extLst>
+              <a:ext uri="{FF2B5EF4-FFF2-40B4-BE49-F238E27FC236}">
+                <a16:creationId xmlns:a16="http://schemas.microsoft.com/office/drawing/2014/main" id="{1F28DEB9-176D-215E-FB04-239FCEDB44BB}"/>
+              </a:ext>
+            </a:extLst>
+          </p:cNvPr>
+          <p:cNvPicPr>
+            <a:picLocks noChangeAspect="1"/>
+          </p:cNvPicPr>
+          <p:nvPr/>
+        </p:nvPicPr>
+        <p:blipFill>
+          <a:blip r:embed="rId50">
+            <a:extLst>
+              <a:ext uri="{28A0092B-C50C-407E-A947-70E740481C1C}">
+                <a14:useLocalDpi xmlns:a14="http://schemas.microsoft.com/office/drawing/2010/main" val="0"/>
+              </a:ext>
+              <a:ext uri="{96DAC541-7B7A-43D3-8B79-37D633B846F1}">
+                <asvg:svgBlip xmlns:asvg="http://schemas.microsoft.com/office/drawing/2016/SVG/main" r:embed="rId51"/>
+              </a:ext>
+            </a:extLst>
+          </a:blip>
+          <a:stretch>
+            <a:fillRect/>
+          </a:stretch>
+        </p:blipFill>
+        <p:spPr>
+          <a:xfrm>
+            <a:off x="10120070" y="155713"/>
+            <a:ext cx="1828800" cy="1828800"/>
+          </a:xfrm>
+          <a:prstGeom prst="rect">
+            <a:avLst/>
+          </a:prstGeom>
+        </p:spPr>
+      </p:pic>
+    </p:spTree>
+    <p:extLst>
+      <p:ext uri="{BB962C8B-B14F-4D97-AF65-F5344CB8AC3E}">
+        <p14:creationId xmlns:p14="http://schemas.microsoft.com/office/powerpoint/2010/main" val="2504027099"/>
+      </p:ext>
+    </p:extLst>
+  </p:cSld>
+  <p:clrMapOvr>
+    <a:masterClrMapping/>
+  </p:clrMapOvr>
+</p:sld>
+</file>
+
 <file path=ppt/theme/theme1.xml><?xml version="1.0" encoding="utf-8"?>
 <a:theme xmlns:a="http://schemas.openxmlformats.org/drawingml/2006/main" name="Office Theme">
   <a:themeElements>

</xml_diff>

<commit_message>
feat: add new icon images for card entries on website
</commit_message>
<xml_diff>
--- a/slides/icons_for_slides.pptx
+++ b/slides/icons_for_slides.pptx
@@ -7,6 +7,7 @@
   <p:sldIdLst>
     <p:sldId id="257" r:id="rId2"/>
     <p:sldId id="258" r:id="rId3"/>
+    <p:sldId id="259" r:id="rId4"/>
   </p:sldIdLst>
   <p:sldSz cx="12192000" cy="6858000"/>
   <p:notesSz cx="6858000" cy="9144000"/>
@@ -260,7 +261,7 @@
           <a:p>
             <a:fld id="{C08B18B5-B1C1-42FF-88E0-4384BC6CEBFD}" type="datetimeFigureOut">
               <a:rPr lang="en-US" smtClean="0"/>
-              <a:t>6/14/2024</a:t>
+              <a:t>6/18/2024</a:t>
             </a:fld>
             <a:endParaRPr lang="en-US"/>
           </a:p>
@@ -458,7 +459,7 @@
           <a:p>
             <a:fld id="{C08B18B5-B1C1-42FF-88E0-4384BC6CEBFD}" type="datetimeFigureOut">
               <a:rPr lang="en-US" smtClean="0"/>
-              <a:t>6/14/2024</a:t>
+              <a:t>6/18/2024</a:t>
             </a:fld>
             <a:endParaRPr lang="en-US"/>
           </a:p>
@@ -666,7 +667,7 @@
           <a:p>
             <a:fld id="{C08B18B5-B1C1-42FF-88E0-4384BC6CEBFD}" type="datetimeFigureOut">
               <a:rPr lang="en-US" smtClean="0"/>
-              <a:t>6/14/2024</a:t>
+              <a:t>6/18/2024</a:t>
             </a:fld>
             <a:endParaRPr lang="en-US"/>
           </a:p>
@@ -864,7 +865,7 @@
           <a:p>
             <a:fld id="{C08B18B5-B1C1-42FF-88E0-4384BC6CEBFD}" type="datetimeFigureOut">
               <a:rPr lang="en-US" smtClean="0"/>
-              <a:t>6/14/2024</a:t>
+              <a:t>6/18/2024</a:t>
             </a:fld>
             <a:endParaRPr lang="en-US"/>
           </a:p>
@@ -1139,7 +1140,7 @@
           <a:p>
             <a:fld id="{C08B18B5-B1C1-42FF-88E0-4384BC6CEBFD}" type="datetimeFigureOut">
               <a:rPr lang="en-US" smtClean="0"/>
-              <a:t>6/14/2024</a:t>
+              <a:t>6/18/2024</a:t>
             </a:fld>
             <a:endParaRPr lang="en-US"/>
           </a:p>
@@ -1404,7 +1405,7 @@
           <a:p>
             <a:fld id="{C08B18B5-B1C1-42FF-88E0-4384BC6CEBFD}" type="datetimeFigureOut">
               <a:rPr lang="en-US" smtClean="0"/>
-              <a:t>6/14/2024</a:t>
+              <a:t>6/18/2024</a:t>
             </a:fld>
             <a:endParaRPr lang="en-US"/>
           </a:p>
@@ -1816,7 +1817,7 @@
           <a:p>
             <a:fld id="{C08B18B5-B1C1-42FF-88E0-4384BC6CEBFD}" type="datetimeFigureOut">
               <a:rPr lang="en-US" smtClean="0"/>
-              <a:t>6/14/2024</a:t>
+              <a:t>6/18/2024</a:t>
             </a:fld>
             <a:endParaRPr lang="en-US"/>
           </a:p>
@@ -1957,7 +1958,7 @@
           <a:p>
             <a:fld id="{C08B18B5-B1C1-42FF-88E0-4384BC6CEBFD}" type="datetimeFigureOut">
               <a:rPr lang="en-US" smtClean="0"/>
-              <a:t>6/14/2024</a:t>
+              <a:t>6/18/2024</a:t>
             </a:fld>
             <a:endParaRPr lang="en-US"/>
           </a:p>
@@ -2070,7 +2071,7 @@
           <a:p>
             <a:fld id="{C08B18B5-B1C1-42FF-88E0-4384BC6CEBFD}" type="datetimeFigureOut">
               <a:rPr lang="en-US" smtClean="0"/>
-              <a:t>6/14/2024</a:t>
+              <a:t>6/18/2024</a:t>
             </a:fld>
             <a:endParaRPr lang="en-US"/>
           </a:p>
@@ -2381,7 +2382,7 @@
           <a:p>
             <a:fld id="{C08B18B5-B1C1-42FF-88E0-4384BC6CEBFD}" type="datetimeFigureOut">
               <a:rPr lang="en-US" smtClean="0"/>
-              <a:t>6/14/2024</a:t>
+              <a:t>6/18/2024</a:t>
             </a:fld>
             <a:endParaRPr lang="en-US"/>
           </a:p>
@@ -2669,7 +2670,7 @@
           <a:p>
             <a:fld id="{C08B18B5-B1C1-42FF-88E0-4384BC6CEBFD}" type="datetimeFigureOut">
               <a:rPr lang="en-US" smtClean="0"/>
-              <a:t>6/14/2024</a:t>
+              <a:t>6/18/2024</a:t>
             </a:fld>
             <a:endParaRPr lang="en-US"/>
           </a:p>
@@ -2910,7 +2911,7 @@
           <a:p>
             <a:fld id="{C08B18B5-B1C1-42FF-88E0-4384BC6CEBFD}" type="datetimeFigureOut">
               <a:rPr lang="en-US" smtClean="0"/>
-              <a:t>6/14/2024</a:t>
+              <a:t>6/18/2024</a:t>
             </a:fld>
             <a:endParaRPr lang="en-US"/>
           </a:p>
@@ -4655,6 +4656,348 @@
 </p:sld>
 </file>
 
+<file path=ppt/slides/slide3.xml><?xml version="1.0" encoding="utf-8"?>
+<p:sld xmlns:a="http://schemas.openxmlformats.org/drawingml/2006/main" xmlns:r="http://schemas.openxmlformats.org/officeDocument/2006/relationships" xmlns:p="http://schemas.openxmlformats.org/presentationml/2006/main">
+  <p:cSld>
+    <p:spTree>
+      <p:nvGrpSpPr>
+        <p:cNvPr id="1" name=""/>
+        <p:cNvGrpSpPr/>
+        <p:nvPr/>
+      </p:nvGrpSpPr>
+      <p:grpSpPr>
+        <a:xfrm>
+          <a:off x="0" y="0"/>
+          <a:ext cx="0" cy="0"/>
+          <a:chOff x="0" y="0"/>
+          <a:chExt cx="0" cy="0"/>
+        </a:xfrm>
+      </p:grpSpPr>
+      <p:pic>
+        <p:nvPicPr>
+          <p:cNvPr id="3" name="Graphic 2" descr="Server with solid fill">
+            <a:extLst>
+              <a:ext uri="{FF2B5EF4-FFF2-40B4-BE49-F238E27FC236}">
+                <a16:creationId xmlns:a16="http://schemas.microsoft.com/office/drawing/2014/main" id="{2E32024A-3BDD-35E8-0C13-C4363336D472}"/>
+              </a:ext>
+            </a:extLst>
+          </p:cNvPr>
+          <p:cNvPicPr>
+            <a:picLocks noChangeAspect="1"/>
+          </p:cNvPicPr>
+          <p:nvPr/>
+        </p:nvPicPr>
+        <p:blipFill>
+          <a:blip r:embed="rId2">
+            <a:extLst>
+              <a:ext uri="{28A0092B-C50C-407E-A947-70E740481C1C}">
+                <a14:useLocalDpi xmlns:a14="http://schemas.microsoft.com/office/drawing/2010/main" val="0"/>
+              </a:ext>
+              <a:ext uri="{96DAC541-7B7A-43D3-8B79-37D633B846F1}">
+                <asvg:svgBlip xmlns:asvg="http://schemas.microsoft.com/office/drawing/2016/SVG/main" r:embed="rId3"/>
+              </a:ext>
+            </a:extLst>
+          </a:blip>
+          <a:stretch>
+            <a:fillRect/>
+          </a:stretch>
+        </p:blipFill>
+        <p:spPr>
+          <a:xfrm>
+            <a:off x="4166616" y="1069848"/>
+            <a:ext cx="1828800" cy="1828800"/>
+          </a:xfrm>
+          <a:prstGeom prst="rect">
+            <a:avLst/>
+          </a:prstGeom>
+        </p:spPr>
+      </p:pic>
+      <p:pic>
+        <p:nvPicPr>
+          <p:cNvPr id="5" name="Graphic 4" descr="Programmer male with solid fill">
+            <a:extLst>
+              <a:ext uri="{FF2B5EF4-FFF2-40B4-BE49-F238E27FC236}">
+                <a16:creationId xmlns:a16="http://schemas.microsoft.com/office/drawing/2014/main" id="{22659B9B-19E2-4AF3-CBD5-31301364FD10}"/>
+              </a:ext>
+            </a:extLst>
+          </p:cNvPr>
+          <p:cNvPicPr>
+            <a:picLocks noChangeAspect="1"/>
+          </p:cNvPicPr>
+          <p:nvPr/>
+        </p:nvPicPr>
+        <p:blipFill>
+          <a:blip r:embed="rId4">
+            <a:extLst>
+              <a:ext uri="{28A0092B-C50C-407E-A947-70E740481C1C}">
+                <a14:useLocalDpi xmlns:a14="http://schemas.microsoft.com/office/drawing/2010/main" val="0"/>
+              </a:ext>
+              <a:ext uri="{96DAC541-7B7A-43D3-8B79-37D633B846F1}">
+                <asvg:svgBlip xmlns:asvg="http://schemas.microsoft.com/office/drawing/2016/SVG/main" r:embed="rId5"/>
+              </a:ext>
+            </a:extLst>
+          </a:blip>
+          <a:stretch>
+            <a:fillRect/>
+          </a:stretch>
+        </p:blipFill>
+        <p:spPr>
+          <a:xfrm>
+            <a:off x="6238800" y="378600"/>
+            <a:ext cx="1828800" cy="1828800"/>
+          </a:xfrm>
+          <a:prstGeom prst="rect">
+            <a:avLst/>
+          </a:prstGeom>
+        </p:spPr>
+      </p:pic>
+      <p:pic>
+        <p:nvPicPr>
+          <p:cNvPr id="7" name="Graphic 6" descr="Programmer female with solid fill">
+            <a:extLst>
+              <a:ext uri="{FF2B5EF4-FFF2-40B4-BE49-F238E27FC236}">
+                <a16:creationId xmlns:a16="http://schemas.microsoft.com/office/drawing/2014/main" id="{DCBCE662-9690-6235-97CF-508FB3261D96}"/>
+              </a:ext>
+            </a:extLst>
+          </p:cNvPr>
+          <p:cNvPicPr>
+            <a:picLocks noChangeAspect="1"/>
+          </p:cNvPicPr>
+          <p:nvPr/>
+        </p:nvPicPr>
+        <p:blipFill>
+          <a:blip r:embed="rId6">
+            <a:extLst>
+              <a:ext uri="{28A0092B-C50C-407E-A947-70E740481C1C}">
+                <a14:useLocalDpi xmlns:a14="http://schemas.microsoft.com/office/drawing/2010/main" val="0"/>
+              </a:ext>
+              <a:ext uri="{96DAC541-7B7A-43D3-8B79-37D633B846F1}">
+                <asvg:svgBlip xmlns:asvg="http://schemas.microsoft.com/office/drawing/2016/SVG/main" r:embed="rId7"/>
+              </a:ext>
+            </a:extLst>
+          </a:blip>
+          <a:stretch>
+            <a:fillRect/>
+          </a:stretch>
+        </p:blipFill>
+        <p:spPr>
+          <a:xfrm>
+            <a:off x="2974296" y="2741448"/>
+            <a:ext cx="1828800" cy="1828800"/>
+          </a:xfrm>
+          <a:prstGeom prst="rect">
+            <a:avLst/>
+          </a:prstGeom>
+        </p:spPr>
+      </p:pic>
+      <p:pic>
+        <p:nvPicPr>
+          <p:cNvPr id="9" name="Graphic 8" descr="Monitor with solid fill">
+            <a:extLst>
+              <a:ext uri="{FF2B5EF4-FFF2-40B4-BE49-F238E27FC236}">
+                <a16:creationId xmlns:a16="http://schemas.microsoft.com/office/drawing/2014/main" id="{15E0A7FE-9F72-536D-E0CE-279779D3E170}"/>
+              </a:ext>
+            </a:extLst>
+          </p:cNvPr>
+          <p:cNvPicPr>
+            <a:picLocks noChangeAspect="1"/>
+          </p:cNvPicPr>
+          <p:nvPr/>
+        </p:nvPicPr>
+        <p:blipFill>
+          <a:blip r:embed="rId8">
+            <a:extLst>
+              <a:ext uri="{28A0092B-C50C-407E-A947-70E740481C1C}">
+                <a14:useLocalDpi xmlns:a14="http://schemas.microsoft.com/office/drawing/2010/main" val="0"/>
+              </a:ext>
+              <a:ext uri="{96DAC541-7B7A-43D3-8B79-37D633B846F1}">
+                <asvg:svgBlip xmlns:asvg="http://schemas.microsoft.com/office/drawing/2016/SVG/main" r:embed="rId9"/>
+              </a:ext>
+            </a:extLst>
+          </a:blip>
+          <a:stretch>
+            <a:fillRect/>
+          </a:stretch>
+        </p:blipFill>
+        <p:spPr>
+          <a:xfrm>
+            <a:off x="1614528" y="907200"/>
+            <a:ext cx="1828800" cy="1828800"/>
+          </a:xfrm>
+          <a:prstGeom prst="rect">
+            <a:avLst/>
+          </a:prstGeom>
+        </p:spPr>
+      </p:pic>
+      <p:pic>
+        <p:nvPicPr>
+          <p:cNvPr id="11" name="Graphic 10" descr="Cloud Computing with solid fill">
+            <a:extLst>
+              <a:ext uri="{FF2B5EF4-FFF2-40B4-BE49-F238E27FC236}">
+                <a16:creationId xmlns:a16="http://schemas.microsoft.com/office/drawing/2014/main" id="{FD8D0750-7D9A-BFF8-301F-2C6A89F9848E}"/>
+              </a:ext>
+            </a:extLst>
+          </p:cNvPr>
+          <p:cNvPicPr>
+            <a:picLocks noChangeAspect="1"/>
+          </p:cNvPicPr>
+          <p:nvPr/>
+        </p:nvPicPr>
+        <p:blipFill>
+          <a:blip r:embed="rId10">
+            <a:extLst>
+              <a:ext uri="{28A0092B-C50C-407E-A947-70E740481C1C}">
+                <a14:useLocalDpi xmlns:a14="http://schemas.microsoft.com/office/drawing/2010/main" val="0"/>
+              </a:ext>
+              <a:ext uri="{96DAC541-7B7A-43D3-8B79-37D633B846F1}">
+                <asvg:svgBlip xmlns:asvg="http://schemas.microsoft.com/office/drawing/2016/SVG/main" r:embed="rId11"/>
+              </a:ext>
+            </a:extLst>
+          </a:blip>
+          <a:stretch>
+            <a:fillRect/>
+          </a:stretch>
+        </p:blipFill>
+        <p:spPr>
+          <a:xfrm>
+            <a:off x="6238800" y="3571800"/>
+            <a:ext cx="1828800" cy="1828800"/>
+          </a:xfrm>
+          <a:prstGeom prst="rect">
+            <a:avLst/>
+          </a:prstGeom>
+        </p:spPr>
+      </p:pic>
+      <p:pic>
+        <p:nvPicPr>
+          <p:cNvPr id="13" name="Graphic 12" descr="Laptop with solid fill">
+            <a:extLst>
+              <a:ext uri="{FF2B5EF4-FFF2-40B4-BE49-F238E27FC236}">
+                <a16:creationId xmlns:a16="http://schemas.microsoft.com/office/drawing/2014/main" id="{40910719-A3E9-77A7-F7BA-52A4D312BBFA}"/>
+              </a:ext>
+            </a:extLst>
+          </p:cNvPr>
+          <p:cNvPicPr>
+            <a:picLocks noChangeAspect="1"/>
+          </p:cNvPicPr>
+          <p:nvPr/>
+        </p:nvPicPr>
+        <p:blipFill>
+          <a:blip r:embed="rId12">
+            <a:extLst>
+              <a:ext uri="{28A0092B-C50C-407E-A947-70E740481C1C}">
+                <a14:useLocalDpi xmlns:a14="http://schemas.microsoft.com/office/drawing/2010/main" val="0"/>
+              </a:ext>
+              <a:ext uri="{96DAC541-7B7A-43D3-8B79-37D633B846F1}">
+                <asvg:svgBlip xmlns:asvg="http://schemas.microsoft.com/office/drawing/2016/SVG/main" r:embed="rId13"/>
+              </a:ext>
+            </a:extLst>
+          </a:blip>
+          <a:stretch>
+            <a:fillRect/>
+          </a:stretch>
+        </p:blipFill>
+        <p:spPr>
+          <a:xfrm>
+            <a:off x="3398712" y="4782504"/>
+            <a:ext cx="1828800" cy="1828800"/>
+          </a:xfrm>
+          <a:prstGeom prst="rect">
+            <a:avLst/>
+          </a:prstGeom>
+        </p:spPr>
+      </p:pic>
+      <p:pic>
+        <p:nvPicPr>
+          <p:cNvPr id="15" name="Graphic 14" descr="Disk with solid fill">
+            <a:extLst>
+              <a:ext uri="{FF2B5EF4-FFF2-40B4-BE49-F238E27FC236}">
+                <a16:creationId xmlns:a16="http://schemas.microsoft.com/office/drawing/2014/main" id="{3CE5B56C-DE7E-697C-6DF8-76BA04F45E50}"/>
+              </a:ext>
+            </a:extLst>
+          </p:cNvPr>
+          <p:cNvPicPr>
+            <a:picLocks noChangeAspect="1"/>
+          </p:cNvPicPr>
+          <p:nvPr/>
+        </p:nvPicPr>
+        <p:blipFill>
+          <a:blip r:embed="rId14">
+            <a:extLst>
+              <a:ext uri="{28A0092B-C50C-407E-A947-70E740481C1C}">
+                <a14:useLocalDpi xmlns:a14="http://schemas.microsoft.com/office/drawing/2010/main" val="0"/>
+              </a:ext>
+              <a:ext uri="{96DAC541-7B7A-43D3-8B79-37D633B846F1}">
+                <asvg:svgBlip xmlns:asvg="http://schemas.microsoft.com/office/drawing/2016/SVG/main" r:embed="rId15"/>
+              </a:ext>
+            </a:extLst>
+          </a:blip>
+          <a:stretch>
+            <a:fillRect/>
+          </a:stretch>
+        </p:blipFill>
+        <p:spPr>
+          <a:xfrm>
+            <a:off x="659208" y="2207400"/>
+            <a:ext cx="1828800" cy="1828800"/>
+          </a:xfrm>
+          <a:prstGeom prst="rect">
+            <a:avLst/>
+          </a:prstGeom>
+        </p:spPr>
+      </p:pic>
+      <p:pic>
+        <p:nvPicPr>
+          <p:cNvPr id="17" name="Graphic 16" descr="Ui Ux with solid fill">
+            <a:extLst>
+              <a:ext uri="{FF2B5EF4-FFF2-40B4-BE49-F238E27FC236}">
+                <a16:creationId xmlns:a16="http://schemas.microsoft.com/office/drawing/2014/main" id="{54D9467D-7D4A-83D0-026E-7D4AFE6DBC23}"/>
+              </a:ext>
+            </a:extLst>
+          </p:cNvPr>
+          <p:cNvPicPr>
+            <a:picLocks noChangeAspect="1"/>
+          </p:cNvPicPr>
+          <p:nvPr/>
+        </p:nvPicPr>
+        <p:blipFill>
+          <a:blip r:embed="rId16">
+            <a:extLst>
+              <a:ext uri="{28A0092B-C50C-407E-A947-70E740481C1C}">
+                <a14:useLocalDpi xmlns:a14="http://schemas.microsoft.com/office/drawing/2010/main" val="0"/>
+              </a:ext>
+              <a:ext uri="{96DAC541-7B7A-43D3-8B79-37D633B846F1}">
+                <asvg:svgBlip xmlns:asvg="http://schemas.microsoft.com/office/drawing/2016/SVG/main" r:embed="rId17"/>
+              </a:ext>
+            </a:extLst>
+          </a:blip>
+          <a:stretch>
+            <a:fillRect/>
+          </a:stretch>
+        </p:blipFill>
+        <p:spPr>
+          <a:xfrm>
+            <a:off x="909792" y="4215768"/>
+            <a:ext cx="1828800" cy="1828800"/>
+          </a:xfrm>
+          <a:prstGeom prst="rect">
+            <a:avLst/>
+          </a:prstGeom>
+        </p:spPr>
+      </p:pic>
+    </p:spTree>
+    <p:extLst>
+      <p:ext uri="{BB962C8B-B14F-4D97-AF65-F5344CB8AC3E}">
+        <p14:creationId xmlns:p14="http://schemas.microsoft.com/office/powerpoint/2010/main" val="570928315"/>
+      </p:ext>
+    </p:extLst>
+  </p:cSld>
+  <p:clrMapOvr>
+    <a:masterClrMapping/>
+  </p:clrMapOvr>
+</p:sld>
+</file>
+
 <file path=ppt/theme/theme1.xml><?xml version="1.0" encoding="utf-8"?>
 <a:theme xmlns:a="http://schemas.openxmlformats.org/drawingml/2006/main" name="Office Theme">
   <a:themeElements>

</xml_diff>

<commit_message>
feat: add additional icons for website cards
</commit_message>
<xml_diff>
--- a/slides/icons_for_slides.pptx
+++ b/slides/icons_for_slides.pptx
@@ -4978,6 +4978,357 @@
         <p:spPr>
           <a:xfrm>
             <a:off x="909792" y="4215768"/>
+            <a:ext cx="1828800" cy="1828800"/>
+          </a:xfrm>
+          <a:prstGeom prst="rect">
+            <a:avLst/>
+          </a:prstGeom>
+        </p:spPr>
+      </p:pic>
+      <p:pic>
+        <p:nvPicPr>
+          <p:cNvPr id="4" name="Graphic 3" descr="Bar chart with solid fill">
+            <a:extLst>
+              <a:ext uri="{FF2B5EF4-FFF2-40B4-BE49-F238E27FC236}">
+                <a16:creationId xmlns:a16="http://schemas.microsoft.com/office/drawing/2014/main" id="{DF66F8DF-BEFF-3BCD-0F75-B3F112F2A8F5}"/>
+              </a:ext>
+            </a:extLst>
+          </p:cNvPr>
+          <p:cNvPicPr>
+            <a:picLocks noChangeAspect="1"/>
+          </p:cNvPicPr>
+          <p:nvPr/>
+        </p:nvPicPr>
+        <p:blipFill>
+          <a:blip r:embed="rId18">
+            <a:extLst>
+              <a:ext uri="{28A0092B-C50C-407E-A947-70E740481C1C}">
+                <a14:useLocalDpi xmlns:a14="http://schemas.microsoft.com/office/drawing/2010/main" val="0"/>
+              </a:ext>
+              <a:ext uri="{96DAC541-7B7A-43D3-8B79-37D633B846F1}">
+                <asvg:svgBlip xmlns:asvg="http://schemas.microsoft.com/office/drawing/2016/SVG/main" r:embed="rId19"/>
+              </a:ext>
+            </a:extLst>
+          </a:blip>
+          <a:stretch>
+            <a:fillRect/>
+          </a:stretch>
+        </p:blipFill>
+        <p:spPr>
+          <a:xfrm>
+            <a:off x="8336352" y="1978704"/>
+            <a:ext cx="914400" cy="914400"/>
+          </a:xfrm>
+          <a:prstGeom prst="rect">
+            <a:avLst/>
+          </a:prstGeom>
+        </p:spPr>
+      </p:pic>
+      <p:pic>
+        <p:nvPicPr>
+          <p:cNvPr id="8" name="Graphic 7" descr="Checklist with solid fill">
+            <a:extLst>
+              <a:ext uri="{FF2B5EF4-FFF2-40B4-BE49-F238E27FC236}">
+                <a16:creationId xmlns:a16="http://schemas.microsoft.com/office/drawing/2014/main" id="{580DAF7C-A115-265C-7484-0E02D33F6B78}"/>
+              </a:ext>
+            </a:extLst>
+          </p:cNvPr>
+          <p:cNvPicPr>
+            <a:picLocks noChangeAspect="1"/>
+          </p:cNvPicPr>
+          <p:nvPr/>
+        </p:nvPicPr>
+        <p:blipFill>
+          <a:blip r:embed="rId20">
+            <a:extLst>
+              <a:ext uri="{28A0092B-C50C-407E-A947-70E740481C1C}">
+                <a14:useLocalDpi xmlns:a14="http://schemas.microsoft.com/office/drawing/2010/main" val="0"/>
+              </a:ext>
+              <a:ext uri="{96DAC541-7B7A-43D3-8B79-37D633B846F1}">
+                <asvg:svgBlip xmlns:asvg="http://schemas.microsoft.com/office/drawing/2016/SVG/main" r:embed="rId21"/>
+              </a:ext>
+            </a:extLst>
+          </a:blip>
+          <a:stretch>
+            <a:fillRect/>
+          </a:stretch>
+        </p:blipFill>
+        <p:spPr>
+          <a:xfrm>
+            <a:off x="8317704" y="3425304"/>
+            <a:ext cx="914400" cy="914400"/>
+          </a:xfrm>
+          <a:prstGeom prst="rect">
+            <a:avLst/>
+          </a:prstGeom>
+        </p:spPr>
+      </p:pic>
+      <p:pic>
+        <p:nvPicPr>
+          <p:cNvPr id="2" name="Graphic 1" descr="Closed quotation mark with solid fill">
+            <a:extLst>
+              <a:ext uri="{FF2B5EF4-FFF2-40B4-BE49-F238E27FC236}">
+                <a16:creationId xmlns:a16="http://schemas.microsoft.com/office/drawing/2014/main" id="{2DE8695D-BDFB-CD30-2B12-7873FA99D4E0}"/>
+              </a:ext>
+            </a:extLst>
+          </p:cNvPr>
+          <p:cNvPicPr>
+            <a:picLocks noChangeAspect="1"/>
+          </p:cNvPicPr>
+          <p:nvPr/>
+        </p:nvPicPr>
+        <p:blipFill>
+          <a:blip r:embed="rId22">
+            <a:extLst>
+              <a:ext uri="{28A0092B-C50C-407E-A947-70E740481C1C}">
+                <a14:useLocalDpi xmlns:a14="http://schemas.microsoft.com/office/drawing/2010/main" val="0"/>
+              </a:ext>
+              <a:ext uri="{96DAC541-7B7A-43D3-8B79-37D633B846F1}">
+                <asvg:svgBlip xmlns:asvg="http://schemas.microsoft.com/office/drawing/2016/SVG/main" r:embed="rId23"/>
+              </a:ext>
+            </a:extLst>
+          </a:blip>
+          <a:stretch>
+            <a:fillRect/>
+          </a:stretch>
+        </p:blipFill>
+        <p:spPr>
+          <a:xfrm>
+            <a:off x="4457712" y="2847576"/>
+            <a:ext cx="1828800" cy="1828800"/>
+          </a:xfrm>
+          <a:prstGeom prst="rect">
+            <a:avLst/>
+          </a:prstGeom>
+        </p:spPr>
+      </p:pic>
+      <p:pic>
+        <p:nvPicPr>
+          <p:cNvPr id="6" name="Graphic 5" descr="Comment Important with solid fill">
+            <a:extLst>
+              <a:ext uri="{FF2B5EF4-FFF2-40B4-BE49-F238E27FC236}">
+                <a16:creationId xmlns:a16="http://schemas.microsoft.com/office/drawing/2014/main" id="{634B1203-93D7-CF1C-9F6F-E078E11C10CD}"/>
+              </a:ext>
+            </a:extLst>
+          </p:cNvPr>
+          <p:cNvPicPr>
+            <a:picLocks noChangeAspect="1"/>
+          </p:cNvPicPr>
+          <p:nvPr/>
+        </p:nvPicPr>
+        <p:blipFill>
+          <a:blip r:embed="rId24">
+            <a:extLst>
+              <a:ext uri="{28A0092B-C50C-407E-A947-70E740481C1C}">
+                <a14:useLocalDpi xmlns:a14="http://schemas.microsoft.com/office/drawing/2010/main" val="0"/>
+              </a:ext>
+              <a:ext uri="{96DAC541-7B7A-43D3-8B79-37D633B846F1}">
+                <asvg:svgBlip xmlns:asvg="http://schemas.microsoft.com/office/drawing/2016/SVG/main" r:embed="rId25"/>
+              </a:ext>
+            </a:extLst>
+          </a:blip>
+          <a:stretch>
+            <a:fillRect/>
+          </a:stretch>
+        </p:blipFill>
+        <p:spPr>
+          <a:xfrm>
+            <a:off x="11110608" y="4590384"/>
+            <a:ext cx="914400" cy="914400"/>
+          </a:xfrm>
+          <a:prstGeom prst="rect">
+            <a:avLst/>
+          </a:prstGeom>
+        </p:spPr>
+      </p:pic>
+      <p:pic>
+        <p:nvPicPr>
+          <p:cNvPr id="19" name="Graphic 18" descr="Comment Like with solid fill">
+            <a:extLst>
+              <a:ext uri="{FF2B5EF4-FFF2-40B4-BE49-F238E27FC236}">
+                <a16:creationId xmlns:a16="http://schemas.microsoft.com/office/drawing/2014/main" id="{1212863F-3639-8F9E-F7F0-EA5C2E73C24F}"/>
+              </a:ext>
+            </a:extLst>
+          </p:cNvPr>
+          <p:cNvPicPr>
+            <a:picLocks noChangeAspect="1"/>
+          </p:cNvPicPr>
+          <p:nvPr/>
+        </p:nvPicPr>
+        <p:blipFill>
+          <a:blip r:embed="rId26">
+            <a:extLst>
+              <a:ext uri="{28A0092B-C50C-407E-A947-70E740481C1C}">
+                <a14:useLocalDpi xmlns:a14="http://schemas.microsoft.com/office/drawing/2010/main" val="0"/>
+              </a:ext>
+              <a:ext uri="{96DAC541-7B7A-43D3-8B79-37D633B846F1}">
+                <asvg:svgBlip xmlns:asvg="http://schemas.microsoft.com/office/drawing/2016/SVG/main" r:embed="rId27"/>
+              </a:ext>
+            </a:extLst>
+          </a:blip>
+          <a:stretch>
+            <a:fillRect/>
+          </a:stretch>
+        </p:blipFill>
+        <p:spPr>
+          <a:xfrm>
+            <a:off x="9670824" y="2194560"/>
+            <a:ext cx="914400" cy="914400"/>
+          </a:xfrm>
+          <a:prstGeom prst="rect">
+            <a:avLst/>
+          </a:prstGeom>
+        </p:spPr>
+      </p:pic>
+      <p:pic>
+        <p:nvPicPr>
+          <p:cNvPr id="21" name="Graphic 20" descr="Connections with solid fill">
+            <a:extLst>
+              <a:ext uri="{FF2B5EF4-FFF2-40B4-BE49-F238E27FC236}">
+                <a16:creationId xmlns:a16="http://schemas.microsoft.com/office/drawing/2014/main" id="{4BDCEE3D-B9B8-6709-75D0-FE3844BC4C58}"/>
+              </a:ext>
+            </a:extLst>
+          </p:cNvPr>
+          <p:cNvPicPr>
+            <a:picLocks noChangeAspect="1"/>
+          </p:cNvPicPr>
+          <p:nvPr/>
+        </p:nvPicPr>
+        <p:blipFill>
+          <a:blip r:embed="rId28">
+            <a:extLst>
+              <a:ext uri="{28A0092B-C50C-407E-A947-70E740481C1C}">
+                <a14:useLocalDpi xmlns:a14="http://schemas.microsoft.com/office/drawing/2010/main" val="0"/>
+              </a:ext>
+              <a:ext uri="{96DAC541-7B7A-43D3-8B79-37D633B846F1}">
+                <asvg:svgBlip xmlns:asvg="http://schemas.microsoft.com/office/drawing/2016/SVG/main" r:embed="rId29"/>
+              </a:ext>
+            </a:extLst>
+          </a:blip>
+          <a:stretch>
+            <a:fillRect/>
+          </a:stretch>
+        </p:blipFill>
+        <p:spPr>
+          <a:xfrm>
+            <a:off x="5781600" y="5539704"/>
+            <a:ext cx="914400" cy="914400"/>
+          </a:xfrm>
+          <a:prstGeom prst="rect">
+            <a:avLst/>
+          </a:prstGeom>
+        </p:spPr>
+      </p:pic>
+      <p:pic>
+        <p:nvPicPr>
+          <p:cNvPr id="23" name="Graphic 22" descr="Head with gears with solid fill">
+            <a:extLst>
+              <a:ext uri="{FF2B5EF4-FFF2-40B4-BE49-F238E27FC236}">
+                <a16:creationId xmlns:a16="http://schemas.microsoft.com/office/drawing/2014/main" id="{A76A536E-9A6B-1ECF-83B6-58E9675B0B90}"/>
+              </a:ext>
+            </a:extLst>
+          </p:cNvPr>
+          <p:cNvPicPr>
+            <a:picLocks noChangeAspect="1"/>
+          </p:cNvPicPr>
+          <p:nvPr/>
+        </p:nvPicPr>
+        <p:blipFill>
+          <a:blip r:embed="rId30">
+            <a:extLst>
+              <a:ext uri="{28A0092B-C50C-407E-A947-70E740481C1C}">
+                <a14:useLocalDpi xmlns:a14="http://schemas.microsoft.com/office/drawing/2010/main" val="0"/>
+              </a:ext>
+              <a:ext uri="{96DAC541-7B7A-43D3-8B79-37D633B846F1}">
+                <asvg:svgBlip xmlns:asvg="http://schemas.microsoft.com/office/drawing/2016/SVG/main" r:embed="rId31"/>
+              </a:ext>
+            </a:extLst>
+          </a:blip>
+          <a:stretch>
+            <a:fillRect/>
+          </a:stretch>
+        </p:blipFill>
+        <p:spPr>
+          <a:xfrm>
+            <a:off x="10075008" y="4789704"/>
+            <a:ext cx="914400" cy="914400"/>
+          </a:xfrm>
+          <a:prstGeom prst="rect">
+            <a:avLst/>
+          </a:prstGeom>
+        </p:spPr>
+      </p:pic>
+      <p:pic>
+        <p:nvPicPr>
+          <p:cNvPr id="25" name="Graphic 24" descr="Remote work with solid fill">
+            <a:extLst>
+              <a:ext uri="{FF2B5EF4-FFF2-40B4-BE49-F238E27FC236}">
+                <a16:creationId xmlns:a16="http://schemas.microsoft.com/office/drawing/2014/main" id="{85651DF3-7A74-7FEE-C934-1E26EF828FE9}"/>
+              </a:ext>
+            </a:extLst>
+          </p:cNvPr>
+          <p:cNvPicPr>
+            <a:picLocks noChangeAspect="1"/>
+          </p:cNvPicPr>
+          <p:nvPr/>
+        </p:nvPicPr>
+        <p:blipFill>
+          <a:blip r:embed="rId32">
+            <a:extLst>
+              <a:ext uri="{28A0092B-C50C-407E-A947-70E740481C1C}">
+                <a14:useLocalDpi xmlns:a14="http://schemas.microsoft.com/office/drawing/2010/main" val="0"/>
+              </a:ext>
+              <a:ext uri="{96DAC541-7B7A-43D3-8B79-37D633B846F1}">
+                <asvg:svgBlip xmlns:asvg="http://schemas.microsoft.com/office/drawing/2016/SVG/main" r:embed="rId33"/>
+              </a:ext>
+            </a:extLst>
+          </a:blip>
+          <a:stretch>
+            <a:fillRect/>
+          </a:stretch>
+        </p:blipFill>
+        <p:spPr>
+          <a:xfrm>
+            <a:off x="10825008" y="3425304"/>
+            <a:ext cx="914400" cy="914400"/>
+          </a:xfrm>
+          <a:prstGeom prst="rect">
+            <a:avLst/>
+          </a:prstGeom>
+        </p:spPr>
+      </p:pic>
+      <p:pic>
+        <p:nvPicPr>
+          <p:cNvPr id="12" name="Graphic 11" descr="Network diagram with solid fill">
+            <a:extLst>
+              <a:ext uri="{FF2B5EF4-FFF2-40B4-BE49-F238E27FC236}">
+                <a16:creationId xmlns:a16="http://schemas.microsoft.com/office/drawing/2014/main" id="{61BD67A6-56E6-7103-760C-E2C925F42EF0}"/>
+              </a:ext>
+            </a:extLst>
+          </p:cNvPr>
+          <p:cNvPicPr>
+            <a:picLocks noChangeAspect="1"/>
+          </p:cNvPicPr>
+          <p:nvPr/>
+        </p:nvPicPr>
+        <p:blipFill>
+          <a:blip r:embed="rId34">
+            <a:extLst>
+              <a:ext uri="{28A0092B-C50C-407E-A947-70E740481C1C}">
+                <a14:useLocalDpi xmlns:a14="http://schemas.microsoft.com/office/drawing/2010/main" val="0"/>
+              </a:ext>
+              <a:ext uri="{96DAC541-7B7A-43D3-8B79-37D633B846F1}">
+                <asvg:svgBlip xmlns:asvg="http://schemas.microsoft.com/office/drawing/2016/SVG/main" r:embed="rId35"/>
+              </a:ext>
+            </a:extLst>
+          </a:blip>
+          <a:stretch>
+            <a:fillRect/>
+          </a:stretch>
+        </p:blipFill>
+        <p:spPr>
+          <a:xfrm>
+            <a:off x="28248" y="149904"/>
             <a:ext cx="1828800" cy="1828800"/>
           </a:xfrm>
           <a:prstGeom prst="rect">

</xml_diff>